<commit_message>
A * has been removed
</commit_message>
<xml_diff>
--- a/images/evolution.pptx
+++ b/images/evolution.pptx
@@ -10789,7 +10789,7 @@
           <p:nvPr>
             <p:extLst>
               <p:ext uri="{D42A27DB-BD31-4B8C-83A1-F6EECF244321}">
-                <p14:modId xmlns:p14="http://schemas.microsoft.com/office/powerpoint/2010/main" val="1726702984"/>
+                <p14:modId xmlns:p14="http://schemas.microsoft.com/office/powerpoint/2010/main" val="2532946539"/>
               </p:ext>
             </p:extLst>
           </p:nvPr>
@@ -13591,8 +13591,13 @@
                       </a:pPr>
                       <a:r>
                         <a:rPr lang="en-US" sz="1400" dirty="0"/>
-                        <a:t>(small and medium subunits)*</a:t>
+                        <a:t>(small and medium </a:t>
                       </a:r>
+                      <a:r>
+                        <a:rPr lang="en-US" sz="1400"/>
+                        <a:t>subunits)</a:t>
+                      </a:r>
+                      <a:endParaRPr lang="en-US" sz="1400" dirty="0"/>
                     </a:p>
                   </a:txBody>
                   <a:tcPr marL="91450" marR="91450" marT="45725" marB="45725" anchor="ctr"/>

</xml_diff>